<commit_message>
tout y est on a 13 pages en palatino
</commit_message>
<xml_diff>
--- a/OppAffaire/Business Plan/SWOT.pptx
+++ b/OppAffaire/Business Plan/SWOT.pptx
@@ -5,7 +5,7 @@
     <p:sldMasterId id="2147483648" r:id="rId1"/>
   </p:sldMasterIdLst>
   <p:sldIdLst>
-    <p:sldId id="256" r:id="rId2"/>
+    <p:sldId id="257" r:id="rId2"/>
   </p:sldIdLst>
   <p:sldSz cx="12192000" cy="6858000"/>
   <p:notesSz cx="6858000" cy="9144000"/>
@@ -2943,372 +2943,464 @@
           <a:chExt cx="0" cy="0"/>
         </a:xfrm>
       </p:grpSpPr>
-      <p:graphicFrame>
-        <p:nvGraphicFramePr>
-          <p:cNvPr id="4" name="Tableau 3"/>
-          <p:cNvGraphicFramePr>
-            <a:graphicFrameLocks noGrp="1"/>
-          </p:cNvGraphicFramePr>
-          <p:nvPr>
-            <p:extLst>
-              <p:ext uri="{D42A27DB-BD31-4B8C-83A1-F6EECF244321}">
-                <p14:modId xmlns:p14="http://schemas.microsoft.com/office/powerpoint/2010/main" val="1123792123"/>
-              </p:ext>
-            </p:extLst>
-          </p:nvPr>
-        </p:nvGraphicFramePr>
-        <p:xfrm>
-          <a:off x="954156" y="92766"/>
-          <a:ext cx="10508974" cy="6877876"/>
-        </p:xfrm>
-        <a:graphic>
-          <a:graphicData uri="http://schemas.openxmlformats.org/drawingml/2006/table">
-            <a:tbl>
-              <a:tblPr firstRow="1" bandRow="1">
-                <a:tableStyleId>{69CF1AB2-1976-4502-BF36-3FF5EA218861}</a:tableStyleId>
-              </a:tblPr>
-              <a:tblGrid>
-                <a:gridCol w="5254487">
-                  <a:extLst>
-                    <a:ext uri="{9D8B030D-6E8A-4147-A177-3AD203B41FA5}">
-                      <a16:colId xmlns:a16="http://schemas.microsoft.com/office/drawing/2014/main" xmlns="" val="192075649"/>
-                    </a:ext>
-                  </a:extLst>
-                </a:gridCol>
-                <a:gridCol w="5254487">
-                  <a:extLst>
-                    <a:ext uri="{9D8B030D-6E8A-4147-A177-3AD203B41FA5}">
-                      <a16:colId xmlns:a16="http://schemas.microsoft.com/office/drawing/2014/main" xmlns="" val="194311872"/>
-                    </a:ext>
-                  </a:extLst>
-                </a:gridCol>
-              </a:tblGrid>
-              <a:tr h="3438938">
-                <a:tc>
-                  <a:txBody>
-                    <a:bodyPr/>
-                    <a:lstStyle/>
-                    <a:p>
-                      <a:pPr algn="ctr"/>
-                      <a:r>
-                        <a:rPr lang="fr-FR" dirty="0" err="1"/>
-                        <a:t>Strengths</a:t>
-                      </a:r>
-                      <a:endParaRPr lang="fr-FR" dirty="0"/>
-                    </a:p>
-                    <a:p>
-                      <a:pPr algn="l"/>
-                      <a:endParaRPr lang="fr-FR" b="0" dirty="0"/>
-                    </a:p>
-                    <a:p>
-                      <a:pPr marL="285750" indent="-285750" algn="l">
-                        <a:buFontTx/>
-                        <a:buChar char="-"/>
-                      </a:pPr>
-                      <a:r>
-                        <a:rPr lang="fr-FR" b="0" dirty="0"/>
-                        <a:t>Jeune projet dynamique</a:t>
-                      </a:r>
-                      <a:r>
-                        <a:rPr lang="fr-FR" b="0" baseline="0" dirty="0"/>
-                        <a:t> au fait des dernières innovations technologiques</a:t>
-                      </a:r>
-                    </a:p>
-                    <a:p>
-                      <a:pPr marL="285750" indent="-285750" algn="l">
-                        <a:buFontTx/>
-                        <a:buChar char="-"/>
-                      </a:pPr>
-                      <a:endParaRPr lang="fr-FR" b="0" dirty="0" smtClean="0"/>
-                    </a:p>
-                    <a:p>
-                      <a:pPr marL="285750" indent="-285750" algn="l">
-                        <a:buFontTx/>
-                        <a:buChar char="-"/>
-                      </a:pPr>
-                      <a:r>
-                        <a:rPr lang="fr-FR" b="0" dirty="0" smtClean="0"/>
-                        <a:t>Brevet déposé</a:t>
-                      </a:r>
-                      <a:r>
-                        <a:rPr lang="fr-FR" b="0" baseline="0" dirty="0" smtClean="0"/>
-                        <a:t> sur une méthode d’obtention d’image super-résolues tridimensionnelles.</a:t>
-                      </a:r>
-                      <a:endParaRPr lang="fr-FR" b="0" dirty="0"/>
-                    </a:p>
-                  </a:txBody>
-                  <a:tcPr>
-                    <a:lnL w="12700" cap="flat" cmpd="sng" algn="ctr">
-                      <a:solidFill>
-                        <a:schemeClr val="tx1"/>
-                      </a:solidFill>
-                      <a:prstDash val="solid"/>
-                      <a:round/>
-                      <a:headEnd type="none" w="med" len="med"/>
-                      <a:tailEnd type="none" w="med" len="med"/>
-                    </a:lnL>
-                    <a:lnR w="12700" cap="flat" cmpd="sng" algn="ctr">
-                      <a:solidFill>
-                        <a:schemeClr val="tx1"/>
-                      </a:solidFill>
-                      <a:prstDash val="solid"/>
-                      <a:round/>
-                      <a:headEnd type="none" w="med" len="med"/>
-                      <a:tailEnd type="none" w="med" len="med"/>
-                    </a:lnR>
-                    <a:lnT w="12700" cap="flat" cmpd="sng" algn="ctr">
-                      <a:solidFill>
-                        <a:schemeClr val="tx1"/>
-                      </a:solidFill>
-                      <a:prstDash val="solid"/>
-                      <a:round/>
-                      <a:headEnd type="none" w="med" len="med"/>
-                      <a:tailEnd type="none" w="med" len="med"/>
-                    </a:lnT>
-                    <a:lnB w="12700" cap="flat" cmpd="sng" algn="ctr">
-                      <a:solidFill>
-                        <a:schemeClr val="tx1"/>
-                      </a:solidFill>
-                      <a:prstDash val="solid"/>
-                      <a:round/>
-                      <a:headEnd type="none" w="med" len="med"/>
-                      <a:tailEnd type="none" w="med" len="med"/>
-                    </a:lnB>
-                  </a:tcPr>
-                </a:tc>
-                <a:tc>
-                  <a:txBody>
-                    <a:bodyPr/>
-                    <a:lstStyle/>
-                    <a:p>
-                      <a:pPr algn="ctr"/>
-                      <a:r>
-                        <a:rPr lang="fr-FR" dirty="0" err="1"/>
-                        <a:t>Weaknesses</a:t>
-                      </a:r>
-                      <a:endParaRPr lang="fr-FR" dirty="0"/>
-                    </a:p>
-                    <a:p>
-                      <a:pPr algn="l"/>
-                      <a:endParaRPr lang="fr-FR" dirty="0"/>
-                    </a:p>
-                    <a:p>
-                      <a:pPr marL="285750" indent="-285750" algn="l">
-                        <a:buFontTx/>
-                        <a:buChar char="-"/>
-                      </a:pPr>
-                      <a:r>
-                        <a:rPr lang="fr-FR" b="0" dirty="0"/>
-                        <a:t>Pas encore d’expérience réelle du monde du travail</a:t>
-                      </a:r>
-                    </a:p>
-                    <a:p>
-                      <a:pPr marL="285750" indent="-285750" algn="l">
-                        <a:buFontTx/>
-                        <a:buChar char="-"/>
-                      </a:pPr>
-                      <a:r>
-                        <a:rPr lang="fr-FR" b="0" dirty="0"/>
-                        <a:t>Pas de</a:t>
-                      </a:r>
-                      <a:r>
-                        <a:rPr lang="fr-FR" b="0" baseline="0" dirty="0"/>
-                        <a:t> notoriété pour le moment</a:t>
-                      </a:r>
-                      <a:endParaRPr lang="fr-FR" b="0" dirty="0"/>
-                    </a:p>
-                    <a:p>
-                      <a:pPr marL="285750" indent="-285750" algn="l">
-                        <a:buFontTx/>
-                        <a:buChar char="-"/>
-                      </a:pPr>
-                      <a:endParaRPr lang="fr-FR" b="0" dirty="0"/>
-                    </a:p>
-                  </a:txBody>
-                  <a:tcPr>
-                    <a:lnL w="12700" cap="flat" cmpd="sng" algn="ctr">
-                      <a:solidFill>
-                        <a:schemeClr val="tx1"/>
-                      </a:solidFill>
-                      <a:prstDash val="solid"/>
-                      <a:round/>
-                      <a:headEnd type="none" w="med" len="med"/>
-                      <a:tailEnd type="none" w="med" len="med"/>
-                    </a:lnL>
-                  </a:tcPr>
-                </a:tc>
-                <a:extLst>
-                  <a:ext uri="{0D108BD9-81ED-4DB2-BD59-A6C34878D82A}">
-                    <a16:rowId xmlns:a16="http://schemas.microsoft.com/office/drawing/2014/main" xmlns="" val="3807185816"/>
-                  </a:ext>
-                </a:extLst>
-              </a:tr>
-              <a:tr h="3438938">
-                <a:tc>
-                  <a:txBody>
-                    <a:bodyPr/>
-                    <a:lstStyle/>
-                    <a:p>
-                      <a:pPr algn="ctr"/>
-                      <a:r>
-                        <a:rPr lang="fr-FR" b="1" dirty="0" err="1" smtClean="0"/>
-                        <a:t>Opportunities</a:t>
-                      </a:r>
-                      <a:endParaRPr lang="fr-FR" b="1" dirty="0"/>
-                    </a:p>
-                    <a:p>
-                      <a:pPr algn="l"/>
-                      <a:endParaRPr lang="fr-FR" b="1" dirty="0"/>
-                    </a:p>
-                    <a:p>
-                      <a:pPr marL="285750" indent="-285750" algn="l">
-                        <a:buFontTx/>
-                        <a:buChar char="-"/>
-                      </a:pPr>
-                      <a:r>
-                        <a:rPr lang="fr-FR" b="0" dirty="0"/>
-                        <a:t>Marché développé à l’international </a:t>
-                      </a:r>
-                    </a:p>
-                    <a:p>
-                      <a:pPr marL="285750" indent="-285750" algn="l">
-                        <a:buFontTx/>
-                        <a:buChar char="-"/>
-                      </a:pPr>
-                      <a:r>
-                        <a:rPr lang="fr-FR" b="0" dirty="0"/>
-                        <a:t>Marché en </a:t>
-                      </a:r>
-                      <a:r>
-                        <a:rPr lang="fr-FR" b="0" dirty="0" smtClean="0"/>
-                        <a:t>croissance : augmentation</a:t>
-                      </a:r>
-                      <a:r>
-                        <a:rPr lang="fr-FR" b="0" baseline="0" dirty="0" smtClean="0"/>
-                        <a:t> des recherche en biologie.</a:t>
-                      </a:r>
-                      <a:endParaRPr lang="fr-FR" b="0" dirty="0"/>
-                    </a:p>
-                    <a:p>
-                      <a:pPr marL="285750" indent="-285750" algn="l">
-                        <a:buFontTx/>
-                        <a:buChar char="-"/>
-                      </a:pPr>
-                      <a:r>
-                        <a:rPr lang="fr-FR" b="0" dirty="0"/>
-                        <a:t>Nouvelle</a:t>
-                      </a:r>
-                      <a:r>
-                        <a:rPr lang="fr-FR" b="0" baseline="0" dirty="0"/>
-                        <a:t> technologie</a:t>
-                      </a:r>
-                      <a:endParaRPr lang="fr-FR" b="0" dirty="0"/>
-                    </a:p>
-                    <a:p>
-                      <a:pPr marL="285750" indent="-285750" algn="l">
-                        <a:buFontTx/>
-                        <a:buChar char="-"/>
-                      </a:pPr>
-                      <a:endParaRPr lang="fr-FR" b="0" dirty="0"/>
-                    </a:p>
-                  </a:txBody>
-                  <a:tcPr>
-                    <a:lnT w="12700" cap="flat" cmpd="sng" algn="ctr">
-                      <a:solidFill>
-                        <a:schemeClr val="tx1"/>
-                      </a:solidFill>
-                      <a:prstDash val="solid"/>
-                      <a:round/>
-                      <a:headEnd type="none" w="med" len="med"/>
-                      <a:tailEnd type="none" w="med" len="med"/>
-                    </a:lnT>
-                  </a:tcPr>
-                </a:tc>
-                <a:tc>
-                  <a:txBody>
-                    <a:bodyPr/>
-                    <a:lstStyle/>
-                    <a:p>
-                      <a:pPr algn="ctr"/>
-                      <a:r>
-                        <a:rPr lang="fr-FR" b="1" dirty="0" err="1"/>
-                        <a:t>Threaths</a:t>
-                      </a:r>
-                      <a:endParaRPr lang="fr-FR" b="1" dirty="0"/>
-                    </a:p>
-                    <a:p>
-                      <a:pPr algn="l"/>
-                      <a:endParaRPr lang="fr-FR" b="0" dirty="0"/>
-                    </a:p>
-                    <a:p>
-                      <a:pPr marL="285750" indent="-285750" algn="l">
-                        <a:buFontTx/>
-                        <a:buChar char="-"/>
-                      </a:pPr>
-                      <a:r>
-                        <a:rPr lang="fr-FR" b="0" dirty="0"/>
-                        <a:t>Secteur de niche </a:t>
-                      </a:r>
-                    </a:p>
-                    <a:p>
-                      <a:pPr marL="285750" indent="-285750" algn="l">
-                        <a:buFontTx/>
-                        <a:buChar char="-"/>
-                      </a:pPr>
-                      <a:r>
-                        <a:rPr lang="fr-FR" b="0" dirty="0"/>
-                        <a:t>Concurrence</a:t>
-                      </a:r>
-                      <a:r>
-                        <a:rPr lang="fr-FR" b="0" baseline="0" dirty="0"/>
-                        <a:t> indirecte </a:t>
-                      </a:r>
-                      <a:r>
-                        <a:rPr lang="fr-FR" b="0" baseline="0" dirty="0" smtClean="0"/>
-                        <a:t>importante</a:t>
-                      </a:r>
-                    </a:p>
-                    <a:p>
-                      <a:pPr marL="285750" indent="-285750" algn="l">
-                        <a:buFontTx/>
-                        <a:buChar char="-"/>
-                      </a:pPr>
-                      <a:r>
-                        <a:rPr lang="fr-FR" b="0" baseline="0" dirty="0" smtClean="0"/>
-                        <a:t>Présence d’acteur de grande envergure sur le marché</a:t>
-                      </a:r>
-                      <a:endParaRPr lang="fr-FR" b="0" dirty="0"/>
-                    </a:p>
-                    <a:p>
-                      <a:pPr marL="285750" indent="-285750" algn="l">
-                        <a:buFontTx/>
-                        <a:buChar char="-"/>
-                      </a:pPr>
-                      <a:endParaRPr lang="fr-FR" b="0" dirty="0"/>
-                    </a:p>
-                  </a:txBody>
-                  <a:tcPr/>
-                </a:tc>
-                <a:extLst>
-                  <a:ext uri="{0D108BD9-81ED-4DB2-BD59-A6C34878D82A}">
-                    <a16:rowId xmlns:a16="http://schemas.microsoft.com/office/drawing/2014/main" xmlns="" val="1884435682"/>
-                  </a:ext>
-                </a:extLst>
-              </a:tr>
-            </a:tbl>
-          </a:graphicData>
-        </a:graphic>
-      </p:graphicFrame>
+      <p:grpSp>
+        <p:nvGrpSpPr>
+          <p:cNvPr id="21" name="Groupe 20"/>
+          <p:cNvGrpSpPr/>
+          <p:nvPr/>
+        </p:nvGrpSpPr>
+        <p:grpSpPr>
+          <a:xfrm>
+            <a:off x="4772025" y="2228850"/>
+            <a:ext cx="2643189" cy="2638425"/>
+            <a:chOff x="12327732" y="0"/>
+            <a:chExt cx="2843214" cy="2843214"/>
+          </a:xfrm>
+        </p:grpSpPr>
+        <p:pic>
+          <p:nvPicPr>
+            <p:cNvPr id="1026" name="Picture 2" descr="C:\Users\Phil\Documents\GitHub\PIMS\OppAffaire\logo-flyer\FarView3.jpg"/>
+            <p:cNvPicPr>
+              <a:picLocks noChangeAspect="1" noChangeArrowheads="1"/>
+            </p:cNvPicPr>
+            <p:nvPr/>
+          </p:nvPicPr>
+          <p:blipFill>
+            <a:blip r:embed="rId2" cstate="print">
+              <a:extLst>
+                <a:ext uri="{BEBA8EAE-BF5A-486C-A8C5-ECC9F3942E4B}">
+                  <a14:imgProps xmlns:a14="http://schemas.microsoft.com/office/drawing/2010/main">
+                    <a14:imgLayer r:embed="rId3">
+                      <a14:imgEffect>
+                        <a14:backgroundRemoval t="3300" b="96100" l="4900" r="90000"/>
+                      </a14:imgEffect>
+                    </a14:imgLayer>
+                  </a14:imgProps>
+                </a:ext>
+                <a:ext uri="{28A0092B-C50C-407E-A947-70E740481C1C}">
+                  <a14:useLocalDpi xmlns:a14="http://schemas.microsoft.com/office/drawing/2010/main" val="0"/>
+                </a:ext>
+              </a:extLst>
+            </a:blip>
+            <a:srcRect/>
+            <a:stretch>
+              <a:fillRect/>
+            </a:stretch>
+          </p:blipFill>
+          <p:spPr bwMode="auto">
+            <a:xfrm>
+              <a:off x="12327732" y="0"/>
+              <a:ext cx="2843214" cy="2843214"/>
+            </a:xfrm>
+            <a:prstGeom prst="rect">
+              <a:avLst/>
+            </a:prstGeom>
+            <a:noFill/>
+            <a:extLst>
+              <a:ext uri="{909E8E84-426E-40DD-AFC4-6F175D3DCCD1}">
+                <a14:hiddenFill xmlns:a14="http://schemas.microsoft.com/office/drawing/2010/main">
+                  <a:solidFill>
+                    <a:srgbClr val="FFFFFF"/>
+                  </a:solidFill>
+                </a14:hiddenFill>
+              </a:ext>
+            </a:extLst>
+          </p:spPr>
+        </p:pic>
+        <p:pic>
+          <p:nvPicPr>
+            <p:cNvPr id="1027" name="Picture 3" descr="C:\Users\Phil\Documents\GitHub\PIMS\OppAffaire\logo-flyer\FAR_V_IEW.png"/>
+            <p:cNvPicPr>
+              <a:picLocks noChangeAspect="1" noChangeArrowheads="1"/>
+            </p:cNvPicPr>
+            <p:nvPr/>
+          </p:nvPicPr>
+          <p:blipFill>
+            <a:blip r:embed="rId4" cstate="print">
+              <a:extLst>
+                <a:ext uri="{28A0092B-C50C-407E-A947-70E740481C1C}">
+                  <a14:useLocalDpi xmlns:a14="http://schemas.microsoft.com/office/drawing/2010/main" val="0"/>
+                </a:ext>
+              </a:extLst>
+            </a:blip>
+            <a:srcRect/>
+            <a:stretch>
+              <a:fillRect/>
+            </a:stretch>
+          </p:blipFill>
+          <p:spPr bwMode="auto">
+            <a:xfrm>
+              <a:off x="12542121" y="921544"/>
+              <a:ext cx="2352522" cy="1000126"/>
+            </a:xfrm>
+            <a:prstGeom prst="rect">
+              <a:avLst/>
+            </a:prstGeom>
+            <a:noFill/>
+            <a:extLst>
+              <a:ext uri="{909E8E84-426E-40DD-AFC4-6F175D3DCCD1}">
+                <a14:hiddenFill xmlns:a14="http://schemas.microsoft.com/office/drawing/2010/main">
+                  <a:solidFill>
+                    <a:srgbClr val="FFFFFF"/>
+                  </a:solidFill>
+                </a14:hiddenFill>
+              </a:ext>
+            </a:extLst>
+          </p:spPr>
+        </p:pic>
+      </p:grpSp>
+      <p:sp>
+        <p:nvSpPr>
+          <p:cNvPr id="26" name="Rectangle à coins arrondis 25"/>
+          <p:cNvSpPr/>
+          <p:nvPr/>
+        </p:nvSpPr>
+        <p:spPr>
+          <a:xfrm>
+            <a:off x="200023" y="342900"/>
+            <a:ext cx="4742731" cy="2505076"/>
+          </a:xfrm>
+          <a:prstGeom prst="roundRect">
+            <a:avLst/>
+          </a:prstGeom>
+        </p:spPr>
+        <p:style>
+          <a:lnRef idx="2">
+            <a:schemeClr val="accent2">
+              <a:shade val="50000"/>
+            </a:schemeClr>
+          </a:lnRef>
+          <a:fillRef idx="1">
+            <a:schemeClr val="accent2"/>
+          </a:fillRef>
+          <a:effectRef idx="0">
+            <a:schemeClr val="accent2"/>
+          </a:effectRef>
+          <a:fontRef idx="minor">
+            <a:schemeClr val="lt1"/>
+          </a:fontRef>
+        </p:style>
+        <p:txBody>
+          <a:bodyPr rtlCol="0" anchor="ctr"/>
+          <a:lstStyle/>
+          <a:p>
+            <a:pPr algn="ctr"/>
+            <a:r>
+              <a:rPr lang="fr-FR" b="1" u="sng" dirty="0" smtClean="0"/>
+              <a:t>Forces</a:t>
+            </a:r>
+          </a:p>
+          <a:p>
+            <a:endParaRPr lang="fr-FR" dirty="0" smtClean="0"/>
+          </a:p>
+          <a:p>
+            <a:pPr marL="285750" indent="-285750">
+              <a:buFontTx/>
+              <a:buChar char="-"/>
+            </a:pPr>
+            <a:r>
+              <a:rPr lang="fr-FR" dirty="0" smtClean="0"/>
+              <a:t>Jeune projet dynamique au fait des dernières innovations technologiques</a:t>
+            </a:r>
+          </a:p>
+          <a:p>
+            <a:pPr marL="285750" indent="-285750">
+              <a:buFontTx/>
+              <a:buChar char="-"/>
+            </a:pPr>
+            <a:r>
+              <a:rPr lang="fr-FR" dirty="0" smtClean="0"/>
+              <a:t>Brevet déposé </a:t>
+            </a:r>
+          </a:p>
+          <a:p>
+            <a:pPr marL="285750" indent="-285750">
+              <a:buFontTx/>
+              <a:buChar char="-"/>
+            </a:pPr>
+            <a:r>
+              <a:rPr lang="fr-FR" dirty="0" smtClean="0"/>
+              <a:t>Multi-compétence des membres</a:t>
+            </a:r>
+            <a:endParaRPr lang="fr-FR" dirty="0"/>
+          </a:p>
+        </p:txBody>
+      </p:sp>
+      <p:sp>
+        <p:nvSpPr>
+          <p:cNvPr id="29" name="Rectangle à coins arrondis 28"/>
+          <p:cNvSpPr/>
+          <p:nvPr/>
+        </p:nvSpPr>
+        <p:spPr>
+          <a:xfrm>
+            <a:off x="7301271" y="380999"/>
+            <a:ext cx="4742731" cy="2466977"/>
+          </a:xfrm>
+          <a:prstGeom prst="roundRect">
+            <a:avLst/>
+          </a:prstGeom>
+        </p:spPr>
+        <p:style>
+          <a:lnRef idx="2">
+            <a:schemeClr val="accent2">
+              <a:shade val="50000"/>
+            </a:schemeClr>
+          </a:lnRef>
+          <a:fillRef idx="1">
+            <a:schemeClr val="accent2"/>
+          </a:fillRef>
+          <a:effectRef idx="0">
+            <a:schemeClr val="accent2"/>
+          </a:effectRef>
+          <a:fontRef idx="minor">
+            <a:schemeClr val="lt1"/>
+          </a:fontRef>
+        </p:style>
+        <p:txBody>
+          <a:bodyPr rtlCol="0" anchor="ctr"/>
+          <a:lstStyle/>
+          <a:p>
+            <a:pPr algn="ctr"/>
+            <a:r>
+              <a:rPr lang="fr-FR" b="1" u="sng" dirty="0"/>
+              <a:t>Faiblesses</a:t>
+            </a:r>
+          </a:p>
+          <a:p>
+            <a:endParaRPr lang="fr-FR" dirty="0"/>
+          </a:p>
+          <a:p>
+            <a:pPr marL="285750" indent="-285750">
+              <a:buFontTx/>
+              <a:buChar char="-"/>
+            </a:pPr>
+            <a:r>
+              <a:rPr lang="fr-FR" dirty="0" smtClean="0"/>
+              <a:t>Un seul et unique produit proposé</a:t>
+            </a:r>
+          </a:p>
+          <a:p>
+            <a:pPr marL="285750" indent="-285750">
+              <a:buFontTx/>
+              <a:buChar char="-"/>
+            </a:pPr>
+            <a:r>
+              <a:rPr lang="fr-FR" dirty="0" smtClean="0"/>
+              <a:t>Pas </a:t>
+            </a:r>
+            <a:r>
+              <a:rPr lang="fr-FR" dirty="0"/>
+              <a:t>de notoriété </a:t>
+            </a:r>
+            <a:r>
+              <a:rPr lang="fr-FR" dirty="0" smtClean="0"/>
+              <a:t>pour </a:t>
+            </a:r>
+            <a:r>
+              <a:rPr lang="fr-FR" dirty="0"/>
+              <a:t>le </a:t>
+            </a:r>
+            <a:r>
+              <a:rPr lang="fr-FR" dirty="0" smtClean="0"/>
+              <a:t>moment sur un marché fermé</a:t>
+            </a:r>
+          </a:p>
+          <a:p>
+            <a:pPr marL="285750" indent="-285750">
+              <a:buFontTx/>
+              <a:buChar char="-"/>
+            </a:pPr>
+            <a:r>
+              <a:rPr lang="fr-FR" dirty="0" smtClean="0"/>
+              <a:t>Peu de </a:t>
+            </a:r>
+            <a:r>
+              <a:rPr lang="fr-FR" smtClean="0"/>
+              <a:t>ressources initiales</a:t>
+            </a:r>
+            <a:endParaRPr lang="fr-FR" dirty="0"/>
+          </a:p>
+          <a:p>
+            <a:pPr marL="285750" indent="-285750">
+              <a:buFontTx/>
+              <a:buChar char="-"/>
+            </a:pPr>
+            <a:endParaRPr lang="fr-FR" dirty="0"/>
+          </a:p>
+        </p:txBody>
+      </p:sp>
+      <p:sp>
+        <p:nvSpPr>
+          <p:cNvPr id="30" name="Rectangle à coins arrondis 29"/>
+          <p:cNvSpPr/>
+          <p:nvPr/>
+        </p:nvSpPr>
+        <p:spPr>
+          <a:xfrm>
+            <a:off x="228600" y="4333877"/>
+            <a:ext cx="4742731" cy="2245518"/>
+          </a:xfrm>
+          <a:prstGeom prst="roundRect">
+            <a:avLst/>
+          </a:prstGeom>
+        </p:spPr>
+        <p:style>
+          <a:lnRef idx="2">
+            <a:schemeClr val="accent2">
+              <a:shade val="50000"/>
+            </a:schemeClr>
+          </a:lnRef>
+          <a:fillRef idx="1">
+            <a:schemeClr val="accent2"/>
+          </a:fillRef>
+          <a:effectRef idx="0">
+            <a:schemeClr val="accent2"/>
+          </a:effectRef>
+          <a:fontRef idx="minor">
+            <a:schemeClr val="lt1"/>
+          </a:fontRef>
+        </p:style>
+        <p:txBody>
+          <a:bodyPr rtlCol="0" anchor="ctr"/>
+          <a:lstStyle/>
+          <a:p>
+            <a:pPr algn="ctr"/>
+            <a:r>
+              <a:rPr lang="fr-FR" b="1" u="sng" dirty="0"/>
+              <a:t>Opportunités</a:t>
+            </a:r>
+          </a:p>
+          <a:p>
+            <a:endParaRPr lang="fr-FR" b="1" dirty="0"/>
+          </a:p>
+          <a:p>
+            <a:pPr marL="285750" indent="-285750">
+              <a:buFontTx/>
+              <a:buChar char="-"/>
+            </a:pPr>
+            <a:r>
+              <a:rPr lang="fr-FR" dirty="0"/>
+              <a:t>Marché développé à l’international </a:t>
+            </a:r>
+          </a:p>
+          <a:p>
+            <a:pPr marL="285750" indent="-285750">
+              <a:buFontTx/>
+              <a:buChar char="-"/>
+            </a:pPr>
+            <a:r>
+              <a:rPr lang="fr-FR" dirty="0"/>
+              <a:t>Marché en croissance : augmentation des recherche en biologie.</a:t>
+            </a:r>
+          </a:p>
+          <a:p>
+            <a:pPr marL="285750" indent="-285750">
+              <a:buFontTx/>
+              <a:buChar char="-"/>
+            </a:pPr>
+            <a:r>
+              <a:rPr lang="fr-FR" dirty="0"/>
+              <a:t>Nouvelle technologie</a:t>
+            </a:r>
+            <a:endParaRPr lang="fr-FR" dirty="0"/>
+          </a:p>
+        </p:txBody>
+      </p:sp>
+      <p:sp>
+        <p:nvSpPr>
+          <p:cNvPr id="31" name="Rectangle à coins arrondis 30"/>
+          <p:cNvSpPr/>
+          <p:nvPr/>
+        </p:nvSpPr>
+        <p:spPr>
+          <a:xfrm>
+            <a:off x="7415213" y="4333875"/>
+            <a:ext cx="4742731" cy="2245520"/>
+          </a:xfrm>
+          <a:prstGeom prst="roundRect">
+            <a:avLst/>
+          </a:prstGeom>
+        </p:spPr>
+        <p:style>
+          <a:lnRef idx="2">
+            <a:schemeClr val="accent2">
+              <a:shade val="50000"/>
+            </a:schemeClr>
+          </a:lnRef>
+          <a:fillRef idx="1">
+            <a:schemeClr val="accent2"/>
+          </a:fillRef>
+          <a:effectRef idx="0">
+            <a:schemeClr val="accent2"/>
+          </a:effectRef>
+          <a:fontRef idx="minor">
+            <a:schemeClr val="lt1"/>
+          </a:fontRef>
+        </p:style>
+        <p:txBody>
+          <a:bodyPr rtlCol="0" anchor="ctr"/>
+          <a:lstStyle/>
+          <a:p>
+            <a:pPr algn="ctr"/>
+            <a:r>
+              <a:rPr lang="fr-FR" b="1" u="sng" dirty="0"/>
+              <a:t>Menaces</a:t>
+            </a:r>
+          </a:p>
+          <a:p>
+            <a:endParaRPr lang="fr-FR" dirty="0"/>
+          </a:p>
+          <a:p>
+            <a:pPr marL="285750" indent="-285750">
+              <a:buFontTx/>
+              <a:buChar char="-"/>
+            </a:pPr>
+            <a:r>
+              <a:rPr lang="fr-FR" dirty="0"/>
+              <a:t>Secteur de niche </a:t>
+            </a:r>
+          </a:p>
+          <a:p>
+            <a:pPr marL="285750" indent="-285750">
+              <a:buFontTx/>
+              <a:buChar char="-"/>
+            </a:pPr>
+            <a:r>
+              <a:rPr lang="fr-FR" dirty="0"/>
+              <a:t>Concurrence indirecte importante</a:t>
+            </a:r>
+          </a:p>
+          <a:p>
+            <a:pPr marL="285750" indent="-285750">
+              <a:buFontTx/>
+              <a:buChar char="-"/>
+            </a:pPr>
+            <a:r>
+              <a:rPr lang="fr-FR" dirty="0"/>
+              <a:t>Présence d’acteurs de grande envergure sur le marché</a:t>
+            </a:r>
+            <a:endParaRPr lang="fr-FR" dirty="0"/>
+          </a:p>
+        </p:txBody>
+      </p:sp>
     </p:spTree>
     <p:extLst>
       <p:ext uri="{BB962C8B-B14F-4D97-AF65-F5344CB8AC3E}">
-        <p14:creationId xmlns:p14="http://schemas.microsoft.com/office/powerpoint/2010/main" val="2020747325"/>
+        <p14:creationId xmlns:p14="http://schemas.microsoft.com/office/powerpoint/2010/main" val="3137956084"/>
       </p:ext>
     </p:extLst>
   </p:cSld>
   <p:clrMapOvr>
     <a:masterClrMapping/>
   </p:clrMapOvr>
+  <p:timing>
+    <p:tnLst>
+      <p:par>
+        <p:cTn id="1" dur="indefinite" restart="never" nodeType="tmRoot"/>
+      </p:par>
+    </p:tnLst>
+  </p:timing>
 </p:sld>
 </file>
 
@@ -3601,7 +3693,7 @@
   <a:extraClrSchemeLst/>
   <a:extLst>
     <a:ext uri="{05A4C25C-085E-4340-85A3-A5531E510DB2}">
-      <thm15:themeFamily xmlns:thm15="http://schemas.microsoft.com/office/thememl/2012/main" xmlns="" name="Office Theme" id="{62F939B6-93AF-4DB8-9C6B-D6C7DFDC589F}" vid="{4A3C46E8-61CC-4603-A589-7422A47A8E4A}"/>
+      <thm15:themeFamily xmlns="" xmlns:thm15="http://schemas.microsoft.com/office/thememl/2012/main" name="Office Theme" id="{62F939B6-93AF-4DB8-9C6B-D6C7DFDC589F}" vid="{4A3C46E8-61CC-4603-A589-7422A47A8E4A}"/>
     </a:ext>
   </a:extLst>
 </a:theme>

</xml_diff>